<commit_message>
Update Final Oral Presentation.pptx
</commit_message>
<xml_diff>
--- a/Reviews/Final Review/Final Oral Presentation.pptx
+++ b/Reviews/Final Review/Final Oral Presentation.pptx
@@ -12787,7 +12787,7 @@
               <a:pPr>
                 <a:defRPr/>
               </a:pPr>
-              <a:t>21-04-2020</a:t>
+              <a:t>22-04-2020</a:t>
             </a:fld>
             <a:endParaRPr lang="en-IN" altLang="en-US"/>
           </a:p>
@@ -13354,7 +13354,7 @@
               <a:pPr>
                 <a:defRPr/>
               </a:pPr>
-              <a:t>4/21/2020</a:t>
+              <a:t>4/22/2020</a:t>
             </a:fld>
             <a:endParaRPr lang="en-US" altLang="zh-CN"/>
           </a:p>
@@ -13570,7 +13570,7 @@
               <a:pPr>
                 <a:defRPr/>
               </a:pPr>
-              <a:t>4/21/2020</a:t>
+              <a:t>4/22/2020</a:t>
             </a:fld>
             <a:endParaRPr lang="en-US" altLang="zh-CN"/>
           </a:p>
@@ -13796,7 +13796,7 @@
               <a:pPr>
                 <a:defRPr/>
               </a:pPr>
-              <a:t>4/21/2020</a:t>
+              <a:t>4/22/2020</a:t>
             </a:fld>
             <a:endParaRPr lang="en-US" altLang="zh-CN"/>
           </a:p>
@@ -14012,7 +14012,7 @@
               <a:pPr>
                 <a:defRPr/>
               </a:pPr>
-              <a:t>4/21/2020</a:t>
+              <a:t>4/22/2020</a:t>
             </a:fld>
             <a:endParaRPr lang="en-US" altLang="zh-CN"/>
           </a:p>
@@ -14305,7 +14305,7 @@
               <a:pPr>
                 <a:defRPr/>
               </a:pPr>
-              <a:t>4/21/2020</a:t>
+              <a:t>4/22/2020</a:t>
             </a:fld>
             <a:endParaRPr lang="en-US" altLang="zh-CN"/>
           </a:p>
@@ -14582,7 +14582,7 @@
               <a:pPr>
                 <a:defRPr/>
               </a:pPr>
-              <a:t>4/21/2020</a:t>
+              <a:t>4/22/2020</a:t>
             </a:fld>
             <a:endParaRPr lang="en-US" altLang="zh-CN"/>
           </a:p>
@@ -14994,7 +14994,7 @@
               <a:pPr>
                 <a:defRPr/>
               </a:pPr>
-              <a:t>4/21/2020</a:t>
+              <a:t>4/22/2020</a:t>
             </a:fld>
             <a:endParaRPr lang="en-US" altLang="zh-CN"/>
           </a:p>
@@ -15159,7 +15159,7 @@
               <a:pPr>
                 <a:defRPr/>
               </a:pPr>
-              <a:t>4/21/2020</a:t>
+              <a:t>4/22/2020</a:t>
             </a:fld>
             <a:endParaRPr lang="en-US" altLang="zh-CN"/>
           </a:p>
@@ -15302,7 +15302,7 @@
               <a:pPr>
                 <a:defRPr/>
               </a:pPr>
-              <a:t>4/21/2020</a:t>
+              <a:t>4/22/2020</a:t>
             </a:fld>
             <a:endParaRPr lang="en-US" altLang="zh-CN"/>
           </a:p>
@@ -15625,7 +15625,7 @@
               <a:pPr>
                 <a:defRPr/>
               </a:pPr>
-              <a:t>4/21/2020</a:t>
+              <a:t>4/22/2020</a:t>
             </a:fld>
             <a:endParaRPr lang="en-US" altLang="zh-CN"/>
           </a:p>
@@ -15929,7 +15929,7 @@
               <a:pPr>
                 <a:defRPr/>
               </a:pPr>
-              <a:t>4/21/2020</a:t>
+              <a:t>4/22/2020</a:t>
             </a:fld>
             <a:endParaRPr lang="en-US" altLang="zh-CN"/>
           </a:p>
@@ -16253,7 +16253,7 @@
               <a:pPr>
                 <a:defRPr/>
               </a:pPr>
-              <a:t>4/21/2020</a:t>
+              <a:t>4/22/2020</a:t>
             </a:fld>
             <a:endParaRPr lang="en-US" altLang="zh-CN"/>
           </a:p>
@@ -17521,7 +17521,7 @@
                 </a:solidFill>
               </a:rPr>
               <a:pPr/>
-              <a:t>4/21/2020</a:t>
+              <a:t>4/22/2020</a:t>
             </a:fld>
             <a:endParaRPr lang="en-US" altLang="zh-CN">
               <a:solidFill>
@@ -18572,7 +18572,7 @@
                 </a:solidFill>
               </a:rPr>
               <a:pPr/>
-              <a:t>4/21/2020</a:t>
+              <a:t>4/22/2020</a:t>
             </a:fld>
             <a:endParaRPr lang="en-US" altLang="zh-CN">
               <a:solidFill>
@@ -18899,7 +18899,7 @@
               <a:pPr>
                 <a:defRPr/>
               </a:pPr>
-              <a:t>4/21/2020</a:t>
+              <a:t>4/22/2020</a:t>
             </a:fld>
             <a:endParaRPr lang="en-US" altLang="zh-CN"/>
           </a:p>
@@ -19077,7 +19077,7 @@
               <a:pPr>
                 <a:defRPr/>
               </a:pPr>
-              <a:t>4/21/2020</a:t>
+              <a:t>4/22/2020</a:t>
             </a:fld>
             <a:endParaRPr lang="en-US" altLang="zh-CN"/>
           </a:p>
@@ -19614,7 +19614,7 @@
               <a:pPr>
                 <a:defRPr/>
               </a:pPr>
-              <a:t>4/21/2020</a:t>
+              <a:t>4/22/2020</a:t>
             </a:fld>
             <a:endParaRPr lang="en-US" altLang="zh-CN"/>
           </a:p>
@@ -20182,7 +20182,7 @@
               <a:pPr>
                 <a:defRPr/>
               </a:pPr>
-              <a:t>4/21/2020</a:t>
+              <a:t>4/22/2020</a:t>
             </a:fld>
             <a:endParaRPr lang="en-US" altLang="zh-CN"/>
           </a:p>
@@ -21308,7 +21308,7 @@
               <a:pPr>
                 <a:defRPr/>
               </a:pPr>
-              <a:t>4/21/2020</a:t>
+              <a:t>4/22/2020</a:t>
             </a:fld>
             <a:endParaRPr lang="en-US" altLang="zh-CN"/>
           </a:p>
@@ -21568,7 +21568,7 @@
                 </a:solidFill>
               </a:rPr>
               <a:pPr/>
-              <a:t>4/21/2020</a:t>
+              <a:t>4/22/2020</a:t>
             </a:fld>
             <a:endParaRPr lang="en-US" altLang="zh-CN">
               <a:solidFill>
@@ -22843,7 +22843,7 @@
                 </a:solidFill>
               </a:rPr>
               <a:pPr/>
-              <a:t>4/21/2020</a:t>
+              <a:t>4/22/2020</a:t>
             </a:fld>
             <a:endParaRPr lang="en-US" altLang="zh-CN">
               <a:solidFill>
@@ -24123,7 +24123,7 @@
                 </a:solidFill>
               </a:rPr>
               <a:pPr/>
-              <a:t>4/21/2020</a:t>
+              <a:t>4/22/2020</a:t>
             </a:fld>
             <a:endParaRPr lang="en-US" altLang="zh-CN">
               <a:solidFill>
@@ -28870,7 +28870,7 @@
                 </a:solidFill>
               </a:rPr>
               <a:pPr/>
-              <a:t>4/21/2020</a:t>
+              <a:t>4/22/2020</a:t>
             </a:fld>
             <a:endParaRPr lang="en-US" altLang="zh-CN">
               <a:solidFill>
@@ -30995,7 +30995,7 @@
                 </a:solidFill>
               </a:rPr>
               <a:pPr/>
-              <a:t>4/21/2020</a:t>
+              <a:t>4/22/2020</a:t>
             </a:fld>
             <a:endParaRPr lang="en-US" altLang="zh-CN">
               <a:solidFill>
@@ -31501,7 +31501,7 @@
                 </a:solidFill>
               </a:rPr>
               <a:pPr/>
-              <a:t>4/21/2020</a:t>
+              <a:t>4/22/2020</a:t>
             </a:fld>
             <a:endParaRPr lang="en-US" altLang="zh-CN">
               <a:solidFill>
@@ -32544,7 +32544,7 @@
                 </a:solidFill>
               </a:rPr>
               <a:pPr/>
-              <a:t>4/21/2020</a:t>
+              <a:t>4/22/2020</a:t>
             </a:fld>
             <a:endParaRPr lang="en-US" altLang="zh-CN">
               <a:solidFill>
@@ -33121,7 +33121,7 @@
                 </a:solidFill>
               </a:rPr>
               <a:pPr/>
-              <a:t>4/21/2020</a:t>
+              <a:t>4/22/2020</a:t>
             </a:fld>
             <a:endParaRPr lang="en-US" altLang="zh-CN">
               <a:solidFill>
@@ -34910,7 +34910,7 @@
                 </a:solidFill>
               </a:rPr>
               <a:pPr/>
-              <a:t>4/21/2020</a:t>
+              <a:t>4/22/2020</a:t>
             </a:fld>
             <a:endParaRPr lang="en-US" altLang="zh-CN">
               <a:solidFill>
@@ -36573,7 +36573,7 @@
               <a:pPr>
                 <a:defRPr/>
               </a:pPr>
-              <a:t>4/21/2020</a:t>
+              <a:t>4/22/2020</a:t>
             </a:fld>
             <a:endParaRPr lang="en-US" altLang="zh-CN" dirty="0"/>
           </a:p>
@@ -38056,7 +38056,7 @@
               <a:pPr>
                 <a:defRPr/>
               </a:pPr>
-              <a:t>4/21/2020</a:t>
+              <a:t>4/22/2020</a:t>
             </a:fld>
             <a:endParaRPr lang="en-US" altLang="zh-CN"/>
           </a:p>
@@ -38301,7 +38301,7 @@
                 </a:solidFill>
               </a:rPr>
               <a:pPr/>
-              <a:t>4/21/2020</a:t>
+              <a:t>4/22/2020</a:t>
             </a:fld>
             <a:endParaRPr lang="en-US" altLang="zh-CN">
               <a:solidFill>
@@ -38826,7 +38826,7 @@
                 </a:solidFill>
               </a:rPr>
               <a:pPr/>
-              <a:t>4/21/2020</a:t>
+              <a:t>4/22/2020</a:t>
             </a:fld>
             <a:endParaRPr lang="en-US" altLang="zh-CN">
               <a:solidFill>
@@ -39404,7 +39404,7 @@
                 </a:solidFill>
               </a:rPr>
               <a:pPr/>
-              <a:t>4/21/2020</a:t>
+              <a:t>4/22/2020</a:t>
             </a:fld>
             <a:endParaRPr lang="en-US" altLang="zh-CN">
               <a:solidFill>
@@ -40060,7 +40060,7 @@
             <a:fld id="{7E3FDB0B-B014-4C47-949F-40696701F18D}" type="datetime1">
               <a:rPr lang="en-US" smtClean="0"/>
               <a:pPr/>
-              <a:t>4/21/2020</a:t>
+              <a:t>4/22/2020</a:t>
             </a:fld>
             <a:endParaRPr lang="en-US"/>
           </a:p>
@@ -40471,7 +40471,7 @@
                 </a:solidFill>
               </a:rPr>
               <a:pPr/>
-              <a:t>4/21/2020</a:t>
+              <a:t>4/22/2020</a:t>
             </a:fld>
             <a:endParaRPr lang="en-US" altLang="zh-CN">
               <a:solidFill>
@@ -40804,7 +40804,7 @@
               <a:pPr>
                 <a:defRPr/>
               </a:pPr>
-              <a:t>4/21/2020</a:t>
+              <a:t>4/22/2020</a:t>
             </a:fld>
             <a:endParaRPr lang="en-US" altLang="zh-CN"/>
           </a:p>
@@ -41054,7 +41054,7 @@
               <a:pPr>
                 <a:defRPr/>
               </a:pPr>
-              <a:t>4/21/2020</a:t>
+              <a:t>4/22/2020</a:t>
             </a:fld>
             <a:endParaRPr lang="en-US" altLang="zh-CN"/>
           </a:p>
@@ -41437,7 +41437,7 @@
                 </a:solidFill>
               </a:rPr>
               <a:pPr/>
-              <a:t>4/21/2020</a:t>
+              <a:t>4/22/2020</a:t>
             </a:fld>
             <a:endParaRPr lang="en-US" altLang="zh-CN">
               <a:solidFill>

</xml_diff>